<commit_message>
Hoàn thành quản lý Component và chọn Template,...
*Thay đổi hoàn toàn cấu trúc làm việc với controller và View (Theo hướng
Component)

-Cho chọn Template ứng với từng Component
-Cho chọn Component mặc định hiển thị
-Cho chọn vài tùy chỉnh trên Shopping

*Chuyển project qua mode "production" (ẩn tất cả các lỗi nếu có trong hệ
thống do chưa xử lý được)
</commit_message>
<xml_diff>
--- a/Presentation.pptx
+++ b/Presentation.pptx
@@ -10,12 +10,13 @@
     <p:sldId id="258" r:id="rId4"/>
     <p:sldId id="259" r:id="rId5"/>
     <p:sldId id="261" r:id="rId6"/>
-    <p:sldId id="260" r:id="rId7"/>
-    <p:sldId id="265" r:id="rId8"/>
-    <p:sldId id="262" r:id="rId9"/>
-    <p:sldId id="264" r:id="rId10"/>
-    <p:sldId id="263" r:id="rId11"/>
-    <p:sldId id="266" r:id="rId12"/>
+    <p:sldId id="267" r:id="rId7"/>
+    <p:sldId id="260" r:id="rId8"/>
+    <p:sldId id="265" r:id="rId9"/>
+    <p:sldId id="262" r:id="rId10"/>
+    <p:sldId id="264" r:id="rId11"/>
+    <p:sldId id="263" r:id="rId12"/>
+    <p:sldId id="266" r:id="rId13"/>
   </p:sldIdLst>
   <p:sldSz cx="9144000" cy="6858000" type="screen4x3"/>
   <p:notesSz cx="6858000" cy="9144000"/>
@@ -114,6 +115,11 @@
       </a:defRPr>
     </a:lvl9pPr>
   </p:defaultTextStyle>
+  <p:extLst>
+    <p:ext uri="{EFAFB233-063F-42B5-8137-9DF3F51BA10A}">
+      <p15:sldGuideLst xmlns:p15="http://schemas.microsoft.com/office/powerpoint/2012/main"/>
+    </p:ext>
+  </p:extLst>
 </p:presentation>
 </file>
 
@@ -1336,6 +1342,47 @@
           <a:chExt cx="0" cy="0"/>
         </a:xfrm>
       </p:grpSpPr>
+      <p:pic>
+        <p:nvPicPr>
+          <p:cNvPr id="1026" name="Picture 2" descr="http://johnshipp.com/wp-content/uploads/2013/10/codeigniter_logo.png"/>
+          <p:cNvPicPr>
+            <a:picLocks noChangeAspect="1" noChangeArrowheads="1"/>
+          </p:cNvPicPr>
+          <p:nvPr/>
+        </p:nvPicPr>
+        <p:blipFill>
+          <a:blip r:embed="rId2">
+            <a:extLst>
+              <a:ext uri="{28A0092B-C50C-407E-A947-70E740481C1C}">
+                <a14:useLocalDpi xmlns:a14="http://schemas.microsoft.com/office/drawing/2010/main" val="0"/>
+              </a:ext>
+            </a:extLst>
+          </a:blip>
+          <a:srcRect/>
+          <a:stretch>
+            <a:fillRect/>
+          </a:stretch>
+        </p:blipFill>
+        <p:spPr bwMode="auto">
+          <a:xfrm>
+            <a:off x="6694414" y="713190"/>
+            <a:ext cx="773855" cy="917906"/>
+          </a:xfrm>
+          <a:prstGeom prst="rect">
+            <a:avLst/>
+          </a:prstGeom>
+          <a:noFill/>
+          <a:extLst>
+            <a:ext uri="{909E8E84-426E-40DD-AFC4-6F175D3DCCD1}">
+              <a14:hiddenFill xmlns:a14="http://schemas.microsoft.com/office/drawing/2010/main">
+                <a:solidFill>
+                  <a:srgbClr val="FFFFFF"/>
+                </a:solidFill>
+              </a14:hiddenFill>
+            </a:ext>
+          </a:extLst>
+        </p:spPr>
+      </p:pic>
       <p:sp>
         <p:nvSpPr>
           <p:cNvPr id="4" name="TextBox 3"/>
@@ -1530,6 +1577,732 @@
 </file>
 
 <file path=ppt/slides/slide10.xml><?xml version="1.0" encoding="utf-8"?>
+<p:sld xmlns:a="http://schemas.openxmlformats.org/drawingml/2006/main" xmlns:r="http://schemas.openxmlformats.org/officeDocument/2006/relationships" xmlns:p="http://schemas.openxmlformats.org/presentationml/2006/main">
+  <p:cSld>
+    <p:spTree>
+      <p:nvGrpSpPr>
+        <p:cNvPr id="1" name=""/>
+        <p:cNvGrpSpPr/>
+        <p:nvPr/>
+      </p:nvGrpSpPr>
+      <p:grpSpPr>
+        <a:xfrm>
+          <a:off x="0" y="0"/>
+          <a:ext cx="0" cy="0"/>
+          <a:chOff x="0" y="0"/>
+          <a:chExt cx="0" cy="0"/>
+        </a:xfrm>
+      </p:grpSpPr>
+      <p:cxnSp>
+        <p:nvCxnSpPr>
+          <p:cNvPr id="19" name="Straight Connector 18"/>
+          <p:cNvCxnSpPr/>
+          <p:nvPr/>
+        </p:nvCxnSpPr>
+        <p:spPr>
+          <a:xfrm flipH="1">
+            <a:off x="1834031" y="1337770"/>
+            <a:ext cx="4679600" cy="0"/>
+          </a:xfrm>
+          <a:prstGeom prst="line">
+            <a:avLst/>
+          </a:prstGeom>
+          <a:ln w="28575">
+            <a:solidFill>
+              <a:schemeClr val="tx1">
+                <a:alpha val="60000"/>
+              </a:schemeClr>
+            </a:solidFill>
+          </a:ln>
+        </p:spPr>
+        <p:style>
+          <a:lnRef idx="1">
+            <a:schemeClr val="accent1"/>
+          </a:lnRef>
+          <a:fillRef idx="0">
+            <a:schemeClr val="accent1"/>
+          </a:fillRef>
+          <a:effectRef idx="0">
+            <a:schemeClr val="accent1"/>
+          </a:effectRef>
+          <a:fontRef idx="minor">
+            <a:schemeClr val="tx1"/>
+          </a:fontRef>
+        </p:style>
+      </p:cxnSp>
+      <p:sp>
+        <p:nvSpPr>
+          <p:cNvPr id="2" name="TextBox 1"/>
+          <p:cNvSpPr txBox="1"/>
+          <p:nvPr/>
+        </p:nvSpPr>
+        <p:spPr>
+          <a:xfrm>
+            <a:off x="90140" y="50920"/>
+            <a:ext cx="6993261" cy="400110"/>
+          </a:xfrm>
+          <a:prstGeom prst="rect">
+            <a:avLst/>
+          </a:prstGeom>
+          <a:noFill/>
+        </p:spPr>
+        <p:txBody>
+          <a:bodyPr wrap="none" rtlCol="0">
+            <a:spAutoFit/>
+          </a:bodyPr>
+          <a:lstStyle/>
+          <a:p>
+            <a:r>
+              <a:rPr lang="en-US" sz="2000" smtClean="0">
+                <a:solidFill>
+                  <a:schemeClr val="bg1"/>
+                </a:solidFill>
+                <a:latin typeface="Segoe UI" panose="020B0502040204020203" pitchFamily="34" charset="0"/>
+                <a:cs typeface="Segoe UI" panose="020B0502040204020203" pitchFamily="34" charset="0"/>
+              </a:rPr>
+              <a:t>Component bus rail &gt;Synchronization between components</a:t>
+            </a:r>
+            <a:endParaRPr lang="en-US" sz="2000">
+              <a:solidFill>
+                <a:schemeClr val="bg1"/>
+              </a:solidFill>
+              <a:latin typeface="Segoe UI" panose="020B0502040204020203" pitchFamily="34" charset="0"/>
+              <a:cs typeface="Segoe UI" panose="020B0502040204020203" pitchFamily="34" charset="0"/>
+            </a:endParaRPr>
+          </a:p>
+        </p:txBody>
+      </p:sp>
+      <p:grpSp>
+        <p:nvGrpSpPr>
+          <p:cNvPr id="3" name="Group 2"/>
+          <p:cNvGrpSpPr/>
+          <p:nvPr/>
+        </p:nvGrpSpPr>
+        <p:grpSpPr>
+          <a:xfrm>
+            <a:off x="0" y="1287196"/>
+            <a:ext cx="9169618" cy="414604"/>
+            <a:chOff x="0" y="144196"/>
+            <a:chExt cx="9169618" cy="414604"/>
+          </a:xfrm>
+        </p:grpSpPr>
+        <p:cxnSp>
+          <p:nvCxnSpPr>
+            <p:cNvPr id="4" name="Straight Connector 3"/>
+            <p:cNvCxnSpPr/>
+            <p:nvPr/>
+          </p:nvCxnSpPr>
+          <p:spPr>
+            <a:xfrm>
+              <a:off x="0" y="558800"/>
+              <a:ext cx="9144000" cy="0"/>
+            </a:xfrm>
+            <a:prstGeom prst="line">
+              <a:avLst/>
+            </a:prstGeom>
+            <a:ln w="57150">
+              <a:solidFill>
+                <a:schemeClr val="tx1">
+                  <a:alpha val="60000"/>
+                </a:schemeClr>
+              </a:solidFill>
+            </a:ln>
+          </p:spPr>
+          <p:style>
+            <a:lnRef idx="1">
+              <a:schemeClr val="accent1"/>
+            </a:lnRef>
+            <a:fillRef idx="0">
+              <a:schemeClr val="accent1"/>
+            </a:fillRef>
+            <a:effectRef idx="0">
+              <a:schemeClr val="accent1"/>
+            </a:effectRef>
+            <a:fontRef idx="minor">
+              <a:schemeClr val="tx1"/>
+            </a:fontRef>
+          </p:style>
+        </p:cxnSp>
+        <p:sp>
+          <p:nvSpPr>
+            <p:cNvPr id="5" name="TextBox 4"/>
+            <p:cNvSpPr txBox="1"/>
+            <p:nvPr/>
+          </p:nvSpPr>
+          <p:spPr>
+            <a:xfrm>
+              <a:off x="6748762" y="144196"/>
+              <a:ext cx="2420856" cy="400110"/>
+            </a:xfrm>
+            <a:prstGeom prst="rect">
+              <a:avLst/>
+            </a:prstGeom>
+            <a:noFill/>
+          </p:spPr>
+          <p:txBody>
+            <a:bodyPr wrap="none" rtlCol="0">
+              <a:spAutoFit/>
+            </a:bodyPr>
+            <a:lstStyle/>
+            <a:p>
+              <a:r>
+                <a:rPr lang="en-US" sz="2000" smtClean="0">
+                  <a:latin typeface="Segoe UI" panose="020B0502040204020203" pitchFamily="34" charset="0"/>
+                  <a:cs typeface="Segoe UI" panose="020B0502040204020203" pitchFamily="34" charset="0"/>
+                </a:rPr>
+                <a:t>Component bus rail</a:t>
+              </a:r>
+              <a:endParaRPr lang="en-US" sz="2000">
+                <a:latin typeface="Segoe UI" panose="020B0502040204020203" pitchFamily="34" charset="0"/>
+                <a:cs typeface="Segoe UI" panose="020B0502040204020203" pitchFamily="34" charset="0"/>
+              </a:endParaRPr>
+            </a:p>
+          </p:txBody>
+        </p:sp>
+      </p:grpSp>
+      <p:sp>
+        <p:nvSpPr>
+          <p:cNvPr id="6" name="Rectangle 5"/>
+          <p:cNvSpPr/>
+          <p:nvPr/>
+        </p:nvSpPr>
+        <p:spPr>
+          <a:xfrm>
+            <a:off x="947265" y="3239343"/>
+            <a:ext cx="1834035" cy="684957"/>
+          </a:xfrm>
+          <a:prstGeom prst="rect">
+            <a:avLst/>
+          </a:prstGeom>
+          <a:noFill/>
+          <a:ln>
+            <a:solidFill>
+              <a:schemeClr val="tx1"/>
+            </a:solidFill>
+          </a:ln>
+        </p:spPr>
+        <p:style>
+          <a:lnRef idx="2">
+            <a:schemeClr val="accent1">
+              <a:shade val="50000"/>
+            </a:schemeClr>
+          </a:lnRef>
+          <a:fillRef idx="1">
+            <a:schemeClr val="accent1"/>
+          </a:fillRef>
+          <a:effectRef idx="0">
+            <a:schemeClr val="accent1"/>
+          </a:effectRef>
+          <a:fontRef idx="minor">
+            <a:schemeClr val="lt1"/>
+          </a:fontRef>
+        </p:style>
+        <p:txBody>
+          <a:bodyPr rtlCol="0" anchor="ctr"/>
+          <a:lstStyle/>
+          <a:p>
+            <a:pPr algn="ctr"/>
+            <a:r>
+              <a:rPr lang="en-US" b="1" smtClean="0">
+                <a:solidFill>
+                  <a:schemeClr val="tx1"/>
+                </a:solidFill>
+                <a:latin typeface="Segoe UI" panose="020B0502040204020203" pitchFamily="34" charset="0"/>
+                <a:cs typeface="Segoe UI" panose="020B0502040204020203" pitchFamily="34" charset="0"/>
+              </a:rPr>
+              <a:t>Admin</a:t>
+            </a:r>
+          </a:p>
+          <a:p>
+            <a:pPr algn="ctr"/>
+            <a:r>
+              <a:rPr lang="en-US" smtClean="0">
+                <a:solidFill>
+                  <a:schemeClr val="tx1"/>
+                </a:solidFill>
+                <a:latin typeface="Segoe UI" panose="020B0502040204020203" pitchFamily="34" charset="0"/>
+                <a:cs typeface="Segoe UI" panose="020B0502040204020203" pitchFamily="34" charset="0"/>
+              </a:rPr>
+              <a:t>component</a:t>
+            </a:r>
+            <a:endParaRPr lang="en-US">
+              <a:solidFill>
+                <a:schemeClr val="tx1"/>
+              </a:solidFill>
+              <a:latin typeface="Segoe UI" panose="020B0502040204020203" pitchFamily="34" charset="0"/>
+              <a:cs typeface="Segoe UI" panose="020B0502040204020203" pitchFamily="34" charset="0"/>
+            </a:endParaRPr>
+          </a:p>
+        </p:txBody>
+      </p:sp>
+      <p:sp>
+        <p:nvSpPr>
+          <p:cNvPr id="7" name="Rectangle 6"/>
+          <p:cNvSpPr/>
+          <p:nvPr/>
+        </p:nvSpPr>
+        <p:spPr>
+          <a:xfrm>
+            <a:off x="4058765" y="3239343"/>
+            <a:ext cx="2115733" cy="684957"/>
+          </a:xfrm>
+          <a:prstGeom prst="rect">
+            <a:avLst/>
+          </a:prstGeom>
+          <a:noFill/>
+          <a:ln>
+            <a:solidFill>
+              <a:schemeClr val="tx1"/>
+            </a:solidFill>
+          </a:ln>
+        </p:spPr>
+        <p:style>
+          <a:lnRef idx="2">
+            <a:schemeClr val="accent1">
+              <a:shade val="50000"/>
+            </a:schemeClr>
+          </a:lnRef>
+          <a:fillRef idx="1">
+            <a:schemeClr val="accent1"/>
+          </a:fillRef>
+          <a:effectRef idx="0">
+            <a:schemeClr val="accent1"/>
+          </a:effectRef>
+          <a:fontRef idx="minor">
+            <a:schemeClr val="lt1"/>
+          </a:fontRef>
+        </p:style>
+        <p:txBody>
+          <a:bodyPr rtlCol="0" anchor="ctr"/>
+          <a:lstStyle/>
+          <a:p>
+            <a:pPr algn="ctr"/>
+            <a:r>
+              <a:rPr lang="en-US" b="1" smtClean="0">
+                <a:solidFill>
+                  <a:schemeClr val="tx1"/>
+                </a:solidFill>
+                <a:latin typeface="Segoe UI" panose="020B0502040204020203" pitchFamily="34" charset="0"/>
+                <a:cs typeface="Segoe UI" panose="020B0502040204020203" pitchFamily="34" charset="0"/>
+              </a:rPr>
+              <a:t>Shopping</a:t>
+            </a:r>
+          </a:p>
+          <a:p>
+            <a:pPr algn="ctr"/>
+            <a:r>
+              <a:rPr lang="en-US" smtClean="0">
+                <a:solidFill>
+                  <a:schemeClr val="tx1"/>
+                </a:solidFill>
+                <a:latin typeface="Segoe UI" panose="020B0502040204020203" pitchFamily="34" charset="0"/>
+                <a:cs typeface="Segoe UI" panose="020B0502040204020203" pitchFamily="34" charset="0"/>
+              </a:rPr>
+              <a:t>component</a:t>
+            </a:r>
+            <a:endParaRPr lang="en-US">
+              <a:solidFill>
+                <a:schemeClr val="tx1"/>
+              </a:solidFill>
+              <a:latin typeface="Segoe UI" panose="020B0502040204020203" pitchFamily="34" charset="0"/>
+              <a:cs typeface="Segoe UI" panose="020B0502040204020203" pitchFamily="34" charset="0"/>
+            </a:endParaRPr>
+          </a:p>
+        </p:txBody>
+      </p:sp>
+      <p:cxnSp>
+        <p:nvCxnSpPr>
+          <p:cNvPr id="8" name="Straight Connector 7"/>
+          <p:cNvCxnSpPr/>
+          <p:nvPr/>
+        </p:nvCxnSpPr>
+        <p:spPr>
+          <a:xfrm>
+            <a:off x="1834030" y="1359430"/>
+            <a:ext cx="0" cy="1879913"/>
+          </a:xfrm>
+          <a:prstGeom prst="line">
+            <a:avLst/>
+          </a:prstGeom>
+          <a:ln w="28575">
+            <a:solidFill>
+              <a:schemeClr val="tx1">
+                <a:alpha val="60000"/>
+              </a:schemeClr>
+            </a:solidFill>
+          </a:ln>
+        </p:spPr>
+        <p:style>
+          <a:lnRef idx="1">
+            <a:schemeClr val="accent1"/>
+          </a:lnRef>
+          <a:fillRef idx="0">
+            <a:schemeClr val="accent1"/>
+          </a:fillRef>
+          <a:effectRef idx="0">
+            <a:schemeClr val="accent1"/>
+          </a:effectRef>
+          <a:fontRef idx="minor">
+            <a:schemeClr val="tx1"/>
+          </a:fontRef>
+        </p:style>
+      </p:cxnSp>
+      <p:cxnSp>
+        <p:nvCxnSpPr>
+          <p:cNvPr id="12" name="Straight Connector 11"/>
+          <p:cNvCxnSpPr/>
+          <p:nvPr/>
+        </p:nvCxnSpPr>
+        <p:spPr>
+          <a:xfrm>
+            <a:off x="5136030" y="1359430"/>
+            <a:ext cx="0" cy="1879913"/>
+          </a:xfrm>
+          <a:prstGeom prst="line">
+            <a:avLst/>
+          </a:prstGeom>
+          <a:ln w="28575">
+            <a:solidFill>
+              <a:schemeClr val="tx1">
+                <a:alpha val="60000"/>
+              </a:schemeClr>
+            </a:solidFill>
+          </a:ln>
+        </p:spPr>
+        <p:style>
+          <a:lnRef idx="1">
+            <a:schemeClr val="accent1"/>
+          </a:lnRef>
+          <a:fillRef idx="0">
+            <a:schemeClr val="accent1"/>
+          </a:fillRef>
+          <a:effectRef idx="0">
+            <a:schemeClr val="accent1"/>
+          </a:effectRef>
+          <a:fontRef idx="minor">
+            <a:schemeClr val="tx1"/>
+          </a:fontRef>
+        </p:style>
+      </p:cxnSp>
+      <p:sp>
+        <p:nvSpPr>
+          <p:cNvPr id="16" name="Rectangle 15"/>
+          <p:cNvSpPr/>
+          <p:nvPr/>
+        </p:nvSpPr>
+        <p:spPr>
+          <a:xfrm>
+            <a:off x="2555203" y="815059"/>
+            <a:ext cx="1834035" cy="848750"/>
+          </a:xfrm>
+          <a:prstGeom prst="rect">
+            <a:avLst/>
+          </a:prstGeom>
+          <a:solidFill>
+            <a:schemeClr val="bg1"/>
+          </a:solidFill>
+          <a:ln>
+            <a:solidFill>
+              <a:schemeClr val="tx1"/>
+            </a:solidFill>
+          </a:ln>
+        </p:spPr>
+        <p:style>
+          <a:lnRef idx="2">
+            <a:schemeClr val="accent1">
+              <a:shade val="50000"/>
+            </a:schemeClr>
+          </a:lnRef>
+          <a:fillRef idx="1">
+            <a:schemeClr val="accent1"/>
+          </a:fillRef>
+          <a:effectRef idx="0">
+            <a:schemeClr val="accent1"/>
+          </a:effectRef>
+          <a:fontRef idx="minor">
+            <a:schemeClr val="lt1"/>
+          </a:fontRef>
+        </p:style>
+        <p:txBody>
+          <a:bodyPr rtlCol="0" anchor="ctr"/>
+          <a:lstStyle/>
+          <a:p>
+            <a:pPr algn="ctr"/>
+            <a:r>
+              <a:rPr lang="en-US" b="1" smtClean="0">
+                <a:solidFill>
+                  <a:schemeClr val="tx1"/>
+                </a:solidFill>
+                <a:latin typeface="Segoe UI" panose="020B0502040204020203" pitchFamily="34" charset="0"/>
+                <a:cs typeface="Segoe UI" panose="020B0502040204020203" pitchFamily="34" charset="0"/>
+              </a:rPr>
+              <a:t>User</a:t>
+            </a:r>
+          </a:p>
+          <a:p>
+            <a:pPr algn="ctr"/>
+            <a:r>
+              <a:rPr lang="en-US" b="1" smtClean="0">
+                <a:solidFill>
+                  <a:schemeClr val="tx1"/>
+                </a:solidFill>
+                <a:latin typeface="Segoe UI" panose="020B0502040204020203" pitchFamily="34" charset="0"/>
+                <a:cs typeface="Segoe UI" panose="020B0502040204020203" pitchFamily="34" charset="0"/>
+              </a:rPr>
+              <a:t>Authentication</a:t>
+            </a:r>
+          </a:p>
+          <a:p>
+            <a:pPr algn="ctr"/>
+            <a:r>
+              <a:rPr lang="en-US" smtClean="0">
+                <a:solidFill>
+                  <a:schemeClr val="tx1"/>
+                </a:solidFill>
+                <a:latin typeface="Segoe UI" panose="020B0502040204020203" pitchFamily="34" charset="0"/>
+                <a:cs typeface="Segoe UI" panose="020B0502040204020203" pitchFamily="34" charset="0"/>
+              </a:rPr>
+              <a:t>Service</a:t>
+            </a:r>
+            <a:endParaRPr lang="en-US">
+              <a:solidFill>
+                <a:schemeClr val="tx1"/>
+              </a:solidFill>
+              <a:latin typeface="Segoe UI" panose="020B0502040204020203" pitchFamily="34" charset="0"/>
+              <a:cs typeface="Segoe UI" panose="020B0502040204020203" pitchFamily="34" charset="0"/>
+            </a:endParaRPr>
+          </a:p>
+        </p:txBody>
+      </p:sp>
+      <p:sp>
+        <p:nvSpPr>
+          <p:cNvPr id="22" name="Rectangle 21"/>
+          <p:cNvSpPr/>
+          <p:nvPr/>
+        </p:nvSpPr>
+        <p:spPr>
+          <a:xfrm>
+            <a:off x="5455765" y="4610943"/>
+            <a:ext cx="2115733" cy="684957"/>
+          </a:xfrm>
+          <a:prstGeom prst="rect">
+            <a:avLst/>
+          </a:prstGeom>
+          <a:noFill/>
+          <a:ln>
+            <a:solidFill>
+              <a:schemeClr val="tx1"/>
+            </a:solidFill>
+          </a:ln>
+        </p:spPr>
+        <p:style>
+          <a:lnRef idx="2">
+            <a:schemeClr val="accent1">
+              <a:shade val="50000"/>
+            </a:schemeClr>
+          </a:lnRef>
+          <a:fillRef idx="1">
+            <a:schemeClr val="accent1"/>
+          </a:fillRef>
+          <a:effectRef idx="0">
+            <a:schemeClr val="accent1"/>
+          </a:effectRef>
+          <a:fontRef idx="minor">
+            <a:schemeClr val="lt1"/>
+          </a:fontRef>
+        </p:style>
+        <p:txBody>
+          <a:bodyPr rtlCol="0" anchor="ctr"/>
+          <a:lstStyle/>
+          <a:p>
+            <a:pPr algn="ctr"/>
+            <a:r>
+              <a:rPr lang="en-US" b="1" smtClean="0">
+                <a:solidFill>
+                  <a:schemeClr val="tx1"/>
+                </a:solidFill>
+                <a:latin typeface="Segoe UI" panose="020B0502040204020203" pitchFamily="34" charset="0"/>
+                <a:cs typeface="Segoe UI" panose="020B0502040204020203" pitchFamily="34" charset="0"/>
+              </a:rPr>
+              <a:t>Blog</a:t>
+            </a:r>
+          </a:p>
+          <a:p>
+            <a:pPr algn="ctr"/>
+            <a:r>
+              <a:rPr lang="en-US" smtClean="0">
+                <a:solidFill>
+                  <a:schemeClr val="tx1"/>
+                </a:solidFill>
+                <a:latin typeface="Segoe UI" panose="020B0502040204020203" pitchFamily="34" charset="0"/>
+                <a:cs typeface="Segoe UI" panose="020B0502040204020203" pitchFamily="34" charset="0"/>
+              </a:rPr>
+              <a:t>component</a:t>
+            </a:r>
+            <a:endParaRPr lang="en-US">
+              <a:solidFill>
+                <a:schemeClr val="tx1"/>
+              </a:solidFill>
+              <a:latin typeface="Segoe UI" panose="020B0502040204020203" pitchFamily="34" charset="0"/>
+              <a:cs typeface="Segoe UI" panose="020B0502040204020203" pitchFamily="34" charset="0"/>
+            </a:endParaRPr>
+          </a:p>
+        </p:txBody>
+      </p:sp>
+      <p:cxnSp>
+        <p:nvCxnSpPr>
+          <p:cNvPr id="23" name="Straight Connector 22"/>
+          <p:cNvCxnSpPr/>
+          <p:nvPr/>
+        </p:nvCxnSpPr>
+        <p:spPr>
+          <a:xfrm>
+            <a:off x="6506161" y="1359430"/>
+            <a:ext cx="0" cy="3251513"/>
+          </a:xfrm>
+          <a:prstGeom prst="line">
+            <a:avLst/>
+          </a:prstGeom>
+          <a:ln w="28575">
+            <a:solidFill>
+              <a:schemeClr val="tx1">
+                <a:alpha val="60000"/>
+              </a:schemeClr>
+            </a:solidFill>
+          </a:ln>
+        </p:spPr>
+        <p:style>
+          <a:lnRef idx="1">
+            <a:schemeClr val="accent1"/>
+          </a:lnRef>
+          <a:fillRef idx="0">
+            <a:schemeClr val="accent1"/>
+          </a:fillRef>
+          <a:effectRef idx="0">
+            <a:schemeClr val="accent1"/>
+          </a:effectRef>
+          <a:fontRef idx="minor">
+            <a:schemeClr val="tx1"/>
+          </a:fontRef>
+        </p:style>
+      </p:cxnSp>
+      <p:sp>
+        <p:nvSpPr>
+          <p:cNvPr id="26" name="TextBox 25"/>
+          <p:cNvSpPr txBox="1"/>
+          <p:nvPr/>
+        </p:nvSpPr>
+        <p:spPr>
+          <a:xfrm rot="16200000">
+            <a:off x="6028813" y="3683129"/>
+            <a:ext cx="1322269" cy="400110"/>
+          </a:xfrm>
+          <a:prstGeom prst="rect">
+            <a:avLst/>
+          </a:prstGeom>
+          <a:noFill/>
+        </p:spPr>
+        <p:txBody>
+          <a:bodyPr wrap="square" rtlCol="0">
+            <a:spAutoFit/>
+          </a:bodyPr>
+          <a:lstStyle/>
+          <a:p>
+            <a:r>
+              <a:rPr lang="en-US" sz="2000" smtClean="0">
+                <a:latin typeface="Segoe UI" panose="020B0502040204020203" pitchFamily="34" charset="0"/>
+                <a:cs typeface="Segoe UI" panose="020B0502040204020203" pitchFamily="34" charset="0"/>
+              </a:rPr>
+              <a:t>member</a:t>
+            </a:r>
+          </a:p>
+        </p:txBody>
+      </p:sp>
+      <p:sp>
+        <p:nvSpPr>
+          <p:cNvPr id="17" name="TextBox 16"/>
+          <p:cNvSpPr txBox="1"/>
+          <p:nvPr/>
+        </p:nvSpPr>
+        <p:spPr>
+          <a:xfrm rot="16200000">
+            <a:off x="4249222" y="2295181"/>
+            <a:ext cx="1322269" cy="400110"/>
+          </a:xfrm>
+          <a:prstGeom prst="rect">
+            <a:avLst/>
+          </a:prstGeom>
+          <a:noFill/>
+        </p:spPr>
+        <p:txBody>
+          <a:bodyPr wrap="square" rtlCol="0">
+            <a:spAutoFit/>
+          </a:bodyPr>
+          <a:lstStyle/>
+          <a:p>
+            <a:r>
+              <a:rPr lang="en-US" sz="2000" smtClean="0">
+                <a:latin typeface="Segoe UI" panose="020B0502040204020203" pitchFamily="34" charset="0"/>
+                <a:cs typeface="Segoe UI" panose="020B0502040204020203" pitchFamily="34" charset="0"/>
+              </a:rPr>
+              <a:t>member</a:t>
+            </a:r>
+          </a:p>
+        </p:txBody>
+      </p:sp>
+      <p:sp>
+        <p:nvSpPr>
+          <p:cNvPr id="18" name="TextBox 17"/>
+          <p:cNvSpPr txBox="1"/>
+          <p:nvPr/>
+        </p:nvSpPr>
+        <p:spPr>
+          <a:xfrm rot="16200000">
+            <a:off x="947222" y="2360859"/>
+            <a:ext cx="1322269" cy="400110"/>
+          </a:xfrm>
+          <a:prstGeom prst="rect">
+            <a:avLst/>
+          </a:prstGeom>
+          <a:noFill/>
+        </p:spPr>
+        <p:txBody>
+          <a:bodyPr wrap="square" rtlCol="0">
+            <a:spAutoFit/>
+          </a:bodyPr>
+          <a:lstStyle/>
+          <a:p>
+            <a:r>
+              <a:rPr lang="en-US" sz="2000" smtClean="0">
+                <a:latin typeface="Segoe UI" panose="020B0502040204020203" pitchFamily="34" charset="0"/>
+                <a:cs typeface="Segoe UI" panose="020B0502040204020203" pitchFamily="34" charset="0"/>
+              </a:rPr>
+              <a:t>member</a:t>
+            </a:r>
+          </a:p>
+        </p:txBody>
+      </p:sp>
+    </p:spTree>
+    <p:extLst>
+      <p:ext uri="{BB962C8B-B14F-4D97-AF65-F5344CB8AC3E}">
+        <p14:creationId xmlns:p14="http://schemas.microsoft.com/office/powerpoint/2010/main" val="1077959041"/>
+      </p:ext>
+    </p:extLst>
+  </p:cSld>
+  <p:clrMapOvr>
+    <a:masterClrMapping/>
+  </p:clrMapOvr>
+  <p:timing>
+    <p:tnLst>
+      <p:par>
+        <p:cTn id="1" dur="indefinite" restart="never" nodeType="tmRoot"/>
+      </p:par>
+    </p:tnLst>
+  </p:timing>
+</p:sld>
+</file>
+
+<file path=ppt/slides/slide11.xml><?xml version="1.0" encoding="utf-8"?>
 <p:sld xmlns:a="http://schemas.openxmlformats.org/drawingml/2006/main" xmlns:r="http://schemas.openxmlformats.org/officeDocument/2006/relationships" xmlns:p="http://schemas.openxmlformats.org/presentationml/2006/main">
   <p:cSld>
     <p:spTree>
@@ -2233,7 +3006,7 @@
 </p:sld>
 </file>
 
-<file path=ppt/slides/slide11.xml><?xml version="1.0" encoding="utf-8"?>
+<file path=ppt/slides/slide12.xml><?xml version="1.0" encoding="utf-8"?>
 <p:sld xmlns:a="http://schemas.openxmlformats.org/drawingml/2006/main" xmlns:r="http://schemas.openxmlformats.org/officeDocument/2006/relationships" xmlns:p="http://schemas.openxmlformats.org/presentationml/2006/main">
   <p:cSld>
     <p:spTree>
@@ -2563,6 +3336,42 @@
           </p:txBody>
         </p:sp>
       </p:grpSp>
+      <p:sp>
+        <p:nvSpPr>
+          <p:cNvPr id="11" name="TextBox 10"/>
+          <p:cNvSpPr txBox="1"/>
+          <p:nvPr/>
+        </p:nvSpPr>
+        <p:spPr>
+          <a:xfrm>
+            <a:off x="7447388" y="1061603"/>
+            <a:ext cx="692818" cy="923330"/>
+          </a:xfrm>
+          <a:prstGeom prst="rect">
+            <a:avLst/>
+          </a:prstGeom>
+          <a:noFill/>
+        </p:spPr>
+        <p:txBody>
+          <a:bodyPr wrap="none" rtlCol="0">
+            <a:spAutoFit/>
+          </a:bodyPr>
+          <a:lstStyle/>
+          <a:p>
+            <a:r>
+              <a:rPr lang="en-US" sz="5400" smtClean="0">
+                <a:latin typeface="Segoe UI" panose="020B0502040204020203" pitchFamily="34" charset="0"/>
+                <a:cs typeface="Segoe UI" panose="020B0502040204020203" pitchFamily="34" charset="0"/>
+              </a:rPr>
+              <a:t>…</a:t>
+            </a:r>
+            <a:endParaRPr lang="en-US" sz="5400">
+              <a:latin typeface="Segoe UI" panose="020B0502040204020203" pitchFamily="34" charset="0"/>
+              <a:cs typeface="Segoe UI" panose="020B0502040204020203" pitchFamily="34" charset="0"/>
+            </a:endParaRPr>
+          </a:p>
+        </p:txBody>
+      </p:sp>
     </p:spTree>
     <p:extLst>
       <p:ext uri="{BB962C8B-B14F-4D97-AF65-F5344CB8AC3E}">
@@ -3503,17 +4312,7 @@
                 <a:latin typeface="Segoe UI" panose="020B0502040204020203" pitchFamily="34" charset="0"/>
                 <a:cs typeface="Segoe UI" panose="020B0502040204020203" pitchFamily="34" charset="0"/>
               </a:rPr>
-              <a:t>rail </a:t>
-            </a:r>
-            <a:r>
-              <a:rPr lang="en-US" sz="2000">
-                <a:solidFill>
-                  <a:schemeClr val="bg1"/>
-                </a:solidFill>
-                <a:latin typeface="Segoe UI" panose="020B0502040204020203" pitchFamily="34" charset="0"/>
-                <a:cs typeface="Segoe UI" panose="020B0502040204020203" pitchFamily="34" charset="0"/>
-              </a:rPr>
-              <a:t>paradigms</a:t>
+              <a:t>rail paradigms</a:t>
             </a:r>
           </a:p>
         </p:txBody>
@@ -4126,7 +4925,7 @@
           <p:spPr>
             <a:xfrm>
               <a:off x="3900140" y="590127"/>
-              <a:ext cx="930063" cy="400110"/>
+              <a:ext cx="873957" cy="400110"/>
             </a:xfrm>
             <a:prstGeom prst="rect">
               <a:avLst/>
@@ -4144,7 +4943,7 @@
                   <a:latin typeface="Segoe UI" panose="020B0502040204020203" pitchFamily="34" charset="0"/>
                   <a:cs typeface="Segoe UI" panose="020B0502040204020203" pitchFamily="34" charset="0"/>
                 </a:rPr>
-                <a:t>Admin</a:t>
+                <a:t>Home</a:t>
               </a:r>
               <a:endParaRPr lang="en-US" sz="2000">
                 <a:latin typeface="Segoe UI" panose="020B0502040204020203" pitchFamily="34" charset="0"/>
@@ -4981,17 +5780,7 @@
                 <a:latin typeface="Segoe UI" panose="020B0502040204020203" pitchFamily="34" charset="0"/>
                 <a:cs typeface="Segoe UI" panose="020B0502040204020203" pitchFamily="34" charset="0"/>
               </a:rPr>
-              <a:t>Admin component </a:t>
-            </a:r>
-            <a:r>
-              <a:rPr lang="en-US" sz="2000">
-                <a:solidFill>
-                  <a:schemeClr val="bg1"/>
-                </a:solidFill>
-                <a:latin typeface="Segoe UI" panose="020B0502040204020203" pitchFamily="34" charset="0"/>
-                <a:cs typeface="Segoe UI" panose="020B0502040204020203" pitchFamily="34" charset="0"/>
-              </a:rPr>
-              <a:t>&gt; </a:t>
+              <a:t>Admin component &gt; </a:t>
             </a:r>
             <a:r>
               <a:rPr lang="en-US" sz="2000" smtClean="0">
@@ -5938,17 +6727,7 @@
                 <a:latin typeface="Segoe UI" panose="020B0502040204020203" pitchFamily="34" charset="0"/>
                 <a:cs typeface="Segoe UI" panose="020B0502040204020203" pitchFamily="34" charset="0"/>
               </a:rPr>
-              <a:t>component </a:t>
-            </a:r>
-            <a:r>
-              <a:rPr lang="en-US" sz="2000">
-                <a:solidFill>
-                  <a:schemeClr val="bg1"/>
-                </a:solidFill>
-                <a:latin typeface="Segoe UI" panose="020B0502040204020203" pitchFamily="34" charset="0"/>
-                <a:cs typeface="Segoe UI" panose="020B0502040204020203" pitchFamily="34" charset="0"/>
-              </a:rPr>
-              <a:t>&gt; </a:t>
+              <a:t>component &gt; </a:t>
             </a:r>
             <a:r>
               <a:rPr lang="en-US" sz="2000" smtClean="0">
@@ -5991,6 +6770,298 @@
 </file>
 
 <file path=ppt/slides/slide6.xml><?xml version="1.0" encoding="utf-8"?>
+<p:sld xmlns:a="http://schemas.openxmlformats.org/drawingml/2006/main" xmlns:r="http://schemas.openxmlformats.org/officeDocument/2006/relationships" xmlns:p="http://schemas.openxmlformats.org/presentationml/2006/main">
+  <p:cSld>
+    <p:spTree>
+      <p:nvGrpSpPr>
+        <p:cNvPr id="1" name=""/>
+        <p:cNvGrpSpPr/>
+        <p:nvPr/>
+      </p:nvGrpSpPr>
+      <p:grpSpPr>
+        <a:xfrm>
+          <a:off x="0" y="0"/>
+          <a:ext cx="0" cy="0"/>
+          <a:chOff x="0" y="0"/>
+          <a:chExt cx="0" cy="0"/>
+        </a:xfrm>
+      </p:grpSpPr>
+      <p:grpSp>
+        <p:nvGrpSpPr>
+          <p:cNvPr id="84" name="Group 83"/>
+          <p:cNvGrpSpPr/>
+          <p:nvPr/>
+        </p:nvGrpSpPr>
+        <p:grpSpPr>
+          <a:xfrm>
+            <a:off x="2539333" y="1224041"/>
+            <a:ext cx="2671635" cy="2124589"/>
+            <a:chOff x="2377506" y="382961"/>
+            <a:chExt cx="2671635" cy="2124589"/>
+          </a:xfrm>
+        </p:grpSpPr>
+        <p:sp>
+          <p:nvSpPr>
+            <p:cNvPr id="2" name="TextBox 1"/>
+            <p:cNvSpPr txBox="1"/>
+            <p:nvPr/>
+          </p:nvSpPr>
+          <p:spPr>
+            <a:xfrm>
+              <a:off x="3238031" y="382961"/>
+              <a:ext cx="873957" cy="400110"/>
+            </a:xfrm>
+            <a:prstGeom prst="rect">
+              <a:avLst/>
+            </a:prstGeom>
+            <a:noFill/>
+          </p:spPr>
+          <p:txBody>
+            <a:bodyPr wrap="none" rtlCol="0">
+              <a:spAutoFit/>
+            </a:bodyPr>
+            <a:lstStyle/>
+            <a:p>
+              <a:r>
+                <a:rPr lang="en-US" sz="2000" smtClean="0">
+                  <a:latin typeface="Segoe UI" panose="020B0502040204020203" pitchFamily="34" charset="0"/>
+                  <a:cs typeface="Segoe UI" panose="020B0502040204020203" pitchFamily="34" charset="0"/>
+                </a:rPr>
+                <a:t>Home</a:t>
+              </a:r>
+              <a:endParaRPr lang="en-US" sz="2000">
+                <a:latin typeface="Segoe UI" panose="020B0502040204020203" pitchFamily="34" charset="0"/>
+                <a:cs typeface="Segoe UI" panose="020B0502040204020203" pitchFamily="34" charset="0"/>
+              </a:endParaRPr>
+            </a:p>
+          </p:txBody>
+        </p:sp>
+        <p:sp>
+          <p:nvSpPr>
+            <p:cNvPr id="3" name="TextBox 2"/>
+            <p:cNvSpPr txBox="1"/>
+            <p:nvPr/>
+          </p:nvSpPr>
+          <p:spPr>
+            <a:xfrm>
+              <a:off x="2377506" y="2094056"/>
+              <a:ext cx="928588" cy="400110"/>
+            </a:xfrm>
+            <a:prstGeom prst="rect">
+              <a:avLst/>
+            </a:prstGeom>
+            <a:noFill/>
+          </p:spPr>
+          <p:txBody>
+            <a:bodyPr wrap="none" rtlCol="0">
+              <a:spAutoFit/>
+            </a:bodyPr>
+            <a:lstStyle/>
+            <a:p>
+              <a:r>
+                <a:rPr lang="en-US" sz="2000" smtClean="0">
+                  <a:latin typeface="Segoe UI" panose="020B0502040204020203" pitchFamily="34" charset="0"/>
+                  <a:cs typeface="Segoe UI" panose="020B0502040204020203" pitchFamily="34" charset="0"/>
+                </a:rPr>
+                <a:t>Post[s]</a:t>
+              </a:r>
+            </a:p>
+          </p:txBody>
+        </p:sp>
+        <p:sp>
+          <p:nvSpPr>
+            <p:cNvPr id="13" name="TextBox 12"/>
+            <p:cNvSpPr txBox="1"/>
+            <p:nvPr/>
+          </p:nvSpPr>
+          <p:spPr>
+            <a:xfrm>
+              <a:off x="4487769" y="1799664"/>
+              <a:ext cx="561372" cy="707886"/>
+            </a:xfrm>
+            <a:prstGeom prst="rect">
+              <a:avLst/>
+            </a:prstGeom>
+            <a:noFill/>
+          </p:spPr>
+          <p:txBody>
+            <a:bodyPr wrap="none" rtlCol="0">
+              <a:spAutoFit/>
+            </a:bodyPr>
+            <a:lstStyle/>
+            <a:p>
+              <a:r>
+                <a:rPr lang="en-US" sz="4000" smtClean="0">
+                  <a:latin typeface="Segoe UI" panose="020B0502040204020203" pitchFamily="34" charset="0"/>
+                  <a:cs typeface="Segoe UI" panose="020B0502040204020203" pitchFamily="34" charset="0"/>
+                </a:rPr>
+                <a:t>…</a:t>
+              </a:r>
+            </a:p>
+          </p:txBody>
+        </p:sp>
+        <p:cxnSp>
+          <p:nvCxnSpPr>
+            <p:cNvPr id="14" name="Straight Connector 13"/>
+            <p:cNvCxnSpPr/>
+            <p:nvPr/>
+          </p:nvCxnSpPr>
+          <p:spPr>
+            <a:xfrm flipH="1">
+              <a:off x="2841800" y="769295"/>
+              <a:ext cx="733185" cy="1217666"/>
+            </a:xfrm>
+            <a:prstGeom prst="line">
+              <a:avLst/>
+            </a:prstGeom>
+            <a:ln w="28575">
+              <a:solidFill>
+                <a:schemeClr val="tx1">
+                  <a:alpha val="60000"/>
+                </a:schemeClr>
+              </a:solidFill>
+              <a:headEnd type="arrow" w="med" len="med"/>
+              <a:tailEnd type="none" w="med" len="med"/>
+            </a:ln>
+          </p:spPr>
+          <p:style>
+            <a:lnRef idx="1">
+              <a:schemeClr val="accent1"/>
+            </a:lnRef>
+            <a:fillRef idx="0">
+              <a:schemeClr val="accent1"/>
+            </a:fillRef>
+            <a:effectRef idx="0">
+              <a:schemeClr val="accent1"/>
+            </a:effectRef>
+            <a:fontRef idx="minor">
+              <a:schemeClr val="tx1"/>
+            </a:fontRef>
+          </p:style>
+        </p:cxnSp>
+      </p:grpSp>
+      <p:sp>
+        <p:nvSpPr>
+          <p:cNvPr id="87" name="TextBox 86"/>
+          <p:cNvSpPr txBox="1"/>
+          <p:nvPr/>
+        </p:nvSpPr>
+        <p:spPr>
+          <a:xfrm>
+            <a:off x="90140" y="50920"/>
+            <a:ext cx="4589718" cy="400110"/>
+          </a:xfrm>
+          <a:prstGeom prst="rect">
+            <a:avLst/>
+          </a:prstGeom>
+          <a:noFill/>
+        </p:spPr>
+        <p:txBody>
+          <a:bodyPr wrap="none" rtlCol="0">
+            <a:spAutoFit/>
+          </a:bodyPr>
+          <a:lstStyle/>
+          <a:p>
+            <a:r>
+              <a:rPr lang="en-US" sz="2000" smtClean="0">
+                <a:solidFill>
+                  <a:schemeClr val="bg1"/>
+                </a:solidFill>
+                <a:latin typeface="Segoe UI" panose="020B0502040204020203" pitchFamily="34" charset="0"/>
+                <a:cs typeface="Segoe UI" panose="020B0502040204020203" pitchFamily="34" charset="0"/>
+              </a:rPr>
+              <a:t>Blog </a:t>
+            </a:r>
+            <a:r>
+              <a:rPr lang="en-US" sz="2000">
+                <a:solidFill>
+                  <a:schemeClr val="bg1"/>
+                </a:solidFill>
+                <a:latin typeface="Segoe UI" panose="020B0502040204020203" pitchFamily="34" charset="0"/>
+                <a:cs typeface="Segoe UI" panose="020B0502040204020203" pitchFamily="34" charset="0"/>
+              </a:rPr>
+              <a:t>component &gt; </a:t>
+            </a:r>
+            <a:r>
+              <a:rPr lang="en-US" sz="2000" smtClean="0">
+                <a:solidFill>
+                  <a:schemeClr val="bg1"/>
+                </a:solidFill>
+                <a:latin typeface="Segoe UI" panose="020B0502040204020203" pitchFamily="34" charset="0"/>
+                <a:cs typeface="Segoe UI" panose="020B0502040204020203" pitchFamily="34" charset="0"/>
+              </a:rPr>
+              <a:t>Module inheritance</a:t>
+            </a:r>
+            <a:endParaRPr lang="en-US" sz="2000">
+              <a:solidFill>
+                <a:schemeClr val="bg1"/>
+              </a:solidFill>
+              <a:latin typeface="Segoe UI" panose="020B0502040204020203" pitchFamily="34" charset="0"/>
+              <a:cs typeface="Segoe UI" panose="020B0502040204020203" pitchFamily="34" charset="0"/>
+            </a:endParaRPr>
+          </a:p>
+        </p:txBody>
+      </p:sp>
+      <p:cxnSp>
+        <p:nvCxnSpPr>
+          <p:cNvPr id="31" name="Straight Connector 30"/>
+          <p:cNvCxnSpPr/>
+          <p:nvPr/>
+        </p:nvCxnSpPr>
+        <p:spPr>
+          <a:xfrm>
+            <a:off x="3996965" y="1624151"/>
+            <a:ext cx="652631" cy="1106039"/>
+          </a:xfrm>
+          <a:prstGeom prst="line">
+            <a:avLst/>
+          </a:prstGeom>
+          <a:ln w="28575">
+            <a:solidFill>
+              <a:schemeClr val="tx1">
+                <a:alpha val="60000"/>
+              </a:schemeClr>
+            </a:solidFill>
+            <a:headEnd type="arrow" w="med" len="med"/>
+            <a:tailEnd type="none" w="med" len="med"/>
+          </a:ln>
+        </p:spPr>
+        <p:style>
+          <a:lnRef idx="1">
+            <a:schemeClr val="accent1"/>
+          </a:lnRef>
+          <a:fillRef idx="0">
+            <a:schemeClr val="accent1"/>
+          </a:fillRef>
+          <a:effectRef idx="0">
+            <a:schemeClr val="accent1"/>
+          </a:effectRef>
+          <a:fontRef idx="minor">
+            <a:schemeClr val="tx1"/>
+          </a:fontRef>
+        </p:style>
+      </p:cxnSp>
+    </p:spTree>
+    <p:extLst>
+      <p:ext uri="{BB962C8B-B14F-4D97-AF65-F5344CB8AC3E}">
+        <p14:creationId xmlns:p14="http://schemas.microsoft.com/office/powerpoint/2010/main" val="878903660"/>
+      </p:ext>
+    </p:extLst>
+  </p:cSld>
+  <p:clrMapOvr>
+    <a:masterClrMapping/>
+  </p:clrMapOvr>
+  <p:timing>
+    <p:tnLst>
+      <p:par>
+        <p:cTn id="1" dur="indefinite" restart="never" nodeType="tmRoot"/>
+      </p:par>
+    </p:tnLst>
+  </p:timing>
+</p:sld>
+</file>
+
+<file path=ppt/slides/slide7.xml><?xml version="1.0" encoding="utf-8"?>
 <p:sld xmlns:a="http://schemas.openxmlformats.org/drawingml/2006/main" xmlns:r="http://schemas.openxmlformats.org/officeDocument/2006/relationships" xmlns:p="http://schemas.openxmlformats.org/presentationml/2006/main">
   <p:cSld>
     <p:spTree>
@@ -8015,7 +9086,7 @@
 </p:sld>
 </file>
 
-<file path=ppt/slides/slide7.xml><?xml version="1.0" encoding="utf-8"?>
+<file path=ppt/slides/slide8.xml><?xml version="1.0" encoding="utf-8"?>
 <p:sld xmlns:a="http://schemas.openxmlformats.org/drawingml/2006/main" xmlns:r="http://schemas.openxmlformats.org/officeDocument/2006/relationships" xmlns:p="http://schemas.openxmlformats.org/presentationml/2006/main">
   <p:cSld>
     <p:spTree>
@@ -8777,7 +9848,7 @@
 </p:sld>
 </file>
 
-<file path=ppt/slides/slide8.xml><?xml version="1.0" encoding="utf-8"?>
+<file path=ppt/slides/slide9.xml><?xml version="1.0" encoding="utf-8"?>
 <p:sld xmlns:a="http://schemas.openxmlformats.org/drawingml/2006/main" xmlns:r="http://schemas.openxmlformats.org/officeDocument/2006/relationships" xmlns:p="http://schemas.openxmlformats.org/presentationml/2006/main">
   <p:cSld>
     <p:spTree>
@@ -8834,17 +9905,7 @@
                 <a:latin typeface="Segoe UI" panose="020B0502040204020203" pitchFamily="34" charset="0"/>
                 <a:cs typeface="Segoe UI" panose="020B0502040204020203" pitchFamily="34" charset="0"/>
               </a:rPr>
-              <a:t>component </a:t>
-            </a:r>
-            <a:r>
-              <a:rPr lang="en-US" sz="2000">
-                <a:solidFill>
-                  <a:schemeClr val="bg1"/>
-                </a:solidFill>
-                <a:latin typeface="Segoe UI" panose="020B0502040204020203" pitchFamily="34" charset="0"/>
-                <a:cs typeface="Segoe UI" panose="020B0502040204020203" pitchFamily="34" charset="0"/>
-              </a:rPr>
-              <a:t>&gt; </a:t>
+              <a:t>component &gt; </a:t>
             </a:r>
             <a:r>
               <a:rPr lang="en-US" sz="2000" smtClean="0">
@@ -9956,732 +11017,6 @@
 </p:sld>
 </file>
 
-<file path=ppt/slides/slide9.xml><?xml version="1.0" encoding="utf-8"?>
-<p:sld xmlns:a="http://schemas.openxmlformats.org/drawingml/2006/main" xmlns:r="http://schemas.openxmlformats.org/officeDocument/2006/relationships" xmlns:p="http://schemas.openxmlformats.org/presentationml/2006/main">
-  <p:cSld>
-    <p:spTree>
-      <p:nvGrpSpPr>
-        <p:cNvPr id="1" name=""/>
-        <p:cNvGrpSpPr/>
-        <p:nvPr/>
-      </p:nvGrpSpPr>
-      <p:grpSpPr>
-        <a:xfrm>
-          <a:off x="0" y="0"/>
-          <a:ext cx="0" cy="0"/>
-          <a:chOff x="0" y="0"/>
-          <a:chExt cx="0" cy="0"/>
-        </a:xfrm>
-      </p:grpSpPr>
-      <p:cxnSp>
-        <p:nvCxnSpPr>
-          <p:cNvPr id="19" name="Straight Connector 18"/>
-          <p:cNvCxnSpPr/>
-          <p:nvPr/>
-        </p:nvCxnSpPr>
-        <p:spPr>
-          <a:xfrm flipH="1">
-            <a:off x="1834031" y="1337770"/>
-            <a:ext cx="4679600" cy="0"/>
-          </a:xfrm>
-          <a:prstGeom prst="line">
-            <a:avLst/>
-          </a:prstGeom>
-          <a:ln w="28575">
-            <a:solidFill>
-              <a:schemeClr val="tx1">
-                <a:alpha val="60000"/>
-              </a:schemeClr>
-            </a:solidFill>
-          </a:ln>
-        </p:spPr>
-        <p:style>
-          <a:lnRef idx="1">
-            <a:schemeClr val="accent1"/>
-          </a:lnRef>
-          <a:fillRef idx="0">
-            <a:schemeClr val="accent1"/>
-          </a:fillRef>
-          <a:effectRef idx="0">
-            <a:schemeClr val="accent1"/>
-          </a:effectRef>
-          <a:fontRef idx="minor">
-            <a:schemeClr val="tx1"/>
-          </a:fontRef>
-        </p:style>
-      </p:cxnSp>
-      <p:sp>
-        <p:nvSpPr>
-          <p:cNvPr id="2" name="TextBox 1"/>
-          <p:cNvSpPr txBox="1"/>
-          <p:nvPr/>
-        </p:nvSpPr>
-        <p:spPr>
-          <a:xfrm>
-            <a:off x="90140" y="50920"/>
-            <a:ext cx="6993261" cy="400110"/>
-          </a:xfrm>
-          <a:prstGeom prst="rect">
-            <a:avLst/>
-          </a:prstGeom>
-          <a:noFill/>
-        </p:spPr>
-        <p:txBody>
-          <a:bodyPr wrap="none" rtlCol="0">
-            <a:spAutoFit/>
-          </a:bodyPr>
-          <a:lstStyle/>
-          <a:p>
-            <a:r>
-              <a:rPr lang="en-US" sz="2000" smtClean="0">
-                <a:solidFill>
-                  <a:schemeClr val="bg1"/>
-                </a:solidFill>
-                <a:latin typeface="Segoe UI" panose="020B0502040204020203" pitchFamily="34" charset="0"/>
-                <a:cs typeface="Segoe UI" panose="020B0502040204020203" pitchFamily="34" charset="0"/>
-              </a:rPr>
-              <a:t>Component bus rail &gt;Synchronization between components</a:t>
-            </a:r>
-            <a:endParaRPr lang="en-US" sz="2000">
-              <a:solidFill>
-                <a:schemeClr val="bg1"/>
-              </a:solidFill>
-              <a:latin typeface="Segoe UI" panose="020B0502040204020203" pitchFamily="34" charset="0"/>
-              <a:cs typeface="Segoe UI" panose="020B0502040204020203" pitchFamily="34" charset="0"/>
-            </a:endParaRPr>
-          </a:p>
-        </p:txBody>
-      </p:sp>
-      <p:grpSp>
-        <p:nvGrpSpPr>
-          <p:cNvPr id="3" name="Group 2"/>
-          <p:cNvGrpSpPr/>
-          <p:nvPr/>
-        </p:nvGrpSpPr>
-        <p:grpSpPr>
-          <a:xfrm>
-            <a:off x="0" y="1287196"/>
-            <a:ext cx="9169618" cy="414604"/>
-            <a:chOff x="0" y="144196"/>
-            <a:chExt cx="9169618" cy="414604"/>
-          </a:xfrm>
-        </p:grpSpPr>
-        <p:cxnSp>
-          <p:nvCxnSpPr>
-            <p:cNvPr id="4" name="Straight Connector 3"/>
-            <p:cNvCxnSpPr/>
-            <p:nvPr/>
-          </p:nvCxnSpPr>
-          <p:spPr>
-            <a:xfrm>
-              <a:off x="0" y="558800"/>
-              <a:ext cx="9144000" cy="0"/>
-            </a:xfrm>
-            <a:prstGeom prst="line">
-              <a:avLst/>
-            </a:prstGeom>
-            <a:ln w="57150">
-              <a:solidFill>
-                <a:schemeClr val="tx1">
-                  <a:alpha val="60000"/>
-                </a:schemeClr>
-              </a:solidFill>
-            </a:ln>
-          </p:spPr>
-          <p:style>
-            <a:lnRef idx="1">
-              <a:schemeClr val="accent1"/>
-            </a:lnRef>
-            <a:fillRef idx="0">
-              <a:schemeClr val="accent1"/>
-            </a:fillRef>
-            <a:effectRef idx="0">
-              <a:schemeClr val="accent1"/>
-            </a:effectRef>
-            <a:fontRef idx="minor">
-              <a:schemeClr val="tx1"/>
-            </a:fontRef>
-          </p:style>
-        </p:cxnSp>
-        <p:sp>
-          <p:nvSpPr>
-            <p:cNvPr id="5" name="TextBox 4"/>
-            <p:cNvSpPr txBox="1"/>
-            <p:nvPr/>
-          </p:nvSpPr>
-          <p:spPr>
-            <a:xfrm>
-              <a:off x="6748762" y="144196"/>
-              <a:ext cx="2420856" cy="400110"/>
-            </a:xfrm>
-            <a:prstGeom prst="rect">
-              <a:avLst/>
-            </a:prstGeom>
-            <a:noFill/>
-          </p:spPr>
-          <p:txBody>
-            <a:bodyPr wrap="none" rtlCol="0">
-              <a:spAutoFit/>
-            </a:bodyPr>
-            <a:lstStyle/>
-            <a:p>
-              <a:r>
-                <a:rPr lang="en-US" sz="2000" smtClean="0">
-                  <a:latin typeface="Segoe UI" panose="020B0502040204020203" pitchFamily="34" charset="0"/>
-                  <a:cs typeface="Segoe UI" panose="020B0502040204020203" pitchFamily="34" charset="0"/>
-                </a:rPr>
-                <a:t>Component bus rail</a:t>
-              </a:r>
-              <a:endParaRPr lang="en-US" sz="2000">
-                <a:latin typeface="Segoe UI" panose="020B0502040204020203" pitchFamily="34" charset="0"/>
-                <a:cs typeface="Segoe UI" panose="020B0502040204020203" pitchFamily="34" charset="0"/>
-              </a:endParaRPr>
-            </a:p>
-          </p:txBody>
-        </p:sp>
-      </p:grpSp>
-      <p:sp>
-        <p:nvSpPr>
-          <p:cNvPr id="6" name="Rectangle 5"/>
-          <p:cNvSpPr/>
-          <p:nvPr/>
-        </p:nvSpPr>
-        <p:spPr>
-          <a:xfrm>
-            <a:off x="947265" y="3239343"/>
-            <a:ext cx="1834035" cy="684957"/>
-          </a:xfrm>
-          <a:prstGeom prst="rect">
-            <a:avLst/>
-          </a:prstGeom>
-          <a:noFill/>
-          <a:ln>
-            <a:solidFill>
-              <a:schemeClr val="tx1"/>
-            </a:solidFill>
-          </a:ln>
-        </p:spPr>
-        <p:style>
-          <a:lnRef idx="2">
-            <a:schemeClr val="accent1">
-              <a:shade val="50000"/>
-            </a:schemeClr>
-          </a:lnRef>
-          <a:fillRef idx="1">
-            <a:schemeClr val="accent1"/>
-          </a:fillRef>
-          <a:effectRef idx="0">
-            <a:schemeClr val="accent1"/>
-          </a:effectRef>
-          <a:fontRef idx="minor">
-            <a:schemeClr val="lt1"/>
-          </a:fontRef>
-        </p:style>
-        <p:txBody>
-          <a:bodyPr rtlCol="0" anchor="ctr"/>
-          <a:lstStyle/>
-          <a:p>
-            <a:pPr algn="ctr"/>
-            <a:r>
-              <a:rPr lang="en-US" b="1" smtClean="0">
-                <a:solidFill>
-                  <a:schemeClr val="tx1"/>
-                </a:solidFill>
-                <a:latin typeface="Segoe UI" panose="020B0502040204020203" pitchFamily="34" charset="0"/>
-                <a:cs typeface="Segoe UI" panose="020B0502040204020203" pitchFamily="34" charset="0"/>
-              </a:rPr>
-              <a:t>Admin</a:t>
-            </a:r>
-          </a:p>
-          <a:p>
-            <a:pPr algn="ctr"/>
-            <a:r>
-              <a:rPr lang="en-US" smtClean="0">
-                <a:solidFill>
-                  <a:schemeClr val="tx1"/>
-                </a:solidFill>
-                <a:latin typeface="Segoe UI" panose="020B0502040204020203" pitchFamily="34" charset="0"/>
-                <a:cs typeface="Segoe UI" panose="020B0502040204020203" pitchFamily="34" charset="0"/>
-              </a:rPr>
-              <a:t>component</a:t>
-            </a:r>
-            <a:endParaRPr lang="en-US">
-              <a:solidFill>
-                <a:schemeClr val="tx1"/>
-              </a:solidFill>
-              <a:latin typeface="Segoe UI" panose="020B0502040204020203" pitchFamily="34" charset="0"/>
-              <a:cs typeface="Segoe UI" panose="020B0502040204020203" pitchFamily="34" charset="0"/>
-            </a:endParaRPr>
-          </a:p>
-        </p:txBody>
-      </p:sp>
-      <p:sp>
-        <p:nvSpPr>
-          <p:cNvPr id="7" name="Rectangle 6"/>
-          <p:cNvSpPr/>
-          <p:nvPr/>
-        </p:nvSpPr>
-        <p:spPr>
-          <a:xfrm>
-            <a:off x="4058765" y="3239343"/>
-            <a:ext cx="2115733" cy="684957"/>
-          </a:xfrm>
-          <a:prstGeom prst="rect">
-            <a:avLst/>
-          </a:prstGeom>
-          <a:noFill/>
-          <a:ln>
-            <a:solidFill>
-              <a:schemeClr val="tx1"/>
-            </a:solidFill>
-          </a:ln>
-        </p:spPr>
-        <p:style>
-          <a:lnRef idx="2">
-            <a:schemeClr val="accent1">
-              <a:shade val="50000"/>
-            </a:schemeClr>
-          </a:lnRef>
-          <a:fillRef idx="1">
-            <a:schemeClr val="accent1"/>
-          </a:fillRef>
-          <a:effectRef idx="0">
-            <a:schemeClr val="accent1"/>
-          </a:effectRef>
-          <a:fontRef idx="minor">
-            <a:schemeClr val="lt1"/>
-          </a:fontRef>
-        </p:style>
-        <p:txBody>
-          <a:bodyPr rtlCol="0" anchor="ctr"/>
-          <a:lstStyle/>
-          <a:p>
-            <a:pPr algn="ctr"/>
-            <a:r>
-              <a:rPr lang="en-US" b="1" smtClean="0">
-                <a:solidFill>
-                  <a:schemeClr val="tx1"/>
-                </a:solidFill>
-                <a:latin typeface="Segoe UI" panose="020B0502040204020203" pitchFamily="34" charset="0"/>
-                <a:cs typeface="Segoe UI" panose="020B0502040204020203" pitchFamily="34" charset="0"/>
-              </a:rPr>
-              <a:t>Shopping</a:t>
-            </a:r>
-          </a:p>
-          <a:p>
-            <a:pPr algn="ctr"/>
-            <a:r>
-              <a:rPr lang="en-US" smtClean="0">
-                <a:solidFill>
-                  <a:schemeClr val="tx1"/>
-                </a:solidFill>
-                <a:latin typeface="Segoe UI" panose="020B0502040204020203" pitchFamily="34" charset="0"/>
-                <a:cs typeface="Segoe UI" panose="020B0502040204020203" pitchFamily="34" charset="0"/>
-              </a:rPr>
-              <a:t>component</a:t>
-            </a:r>
-            <a:endParaRPr lang="en-US">
-              <a:solidFill>
-                <a:schemeClr val="tx1"/>
-              </a:solidFill>
-              <a:latin typeface="Segoe UI" panose="020B0502040204020203" pitchFamily="34" charset="0"/>
-              <a:cs typeface="Segoe UI" panose="020B0502040204020203" pitchFamily="34" charset="0"/>
-            </a:endParaRPr>
-          </a:p>
-        </p:txBody>
-      </p:sp>
-      <p:cxnSp>
-        <p:nvCxnSpPr>
-          <p:cNvPr id="8" name="Straight Connector 7"/>
-          <p:cNvCxnSpPr/>
-          <p:nvPr/>
-        </p:nvCxnSpPr>
-        <p:spPr>
-          <a:xfrm>
-            <a:off x="1834030" y="1359430"/>
-            <a:ext cx="0" cy="1879913"/>
-          </a:xfrm>
-          <a:prstGeom prst="line">
-            <a:avLst/>
-          </a:prstGeom>
-          <a:ln w="28575">
-            <a:solidFill>
-              <a:schemeClr val="tx1">
-                <a:alpha val="60000"/>
-              </a:schemeClr>
-            </a:solidFill>
-          </a:ln>
-        </p:spPr>
-        <p:style>
-          <a:lnRef idx="1">
-            <a:schemeClr val="accent1"/>
-          </a:lnRef>
-          <a:fillRef idx="0">
-            <a:schemeClr val="accent1"/>
-          </a:fillRef>
-          <a:effectRef idx="0">
-            <a:schemeClr val="accent1"/>
-          </a:effectRef>
-          <a:fontRef idx="minor">
-            <a:schemeClr val="tx1"/>
-          </a:fontRef>
-        </p:style>
-      </p:cxnSp>
-      <p:cxnSp>
-        <p:nvCxnSpPr>
-          <p:cNvPr id="12" name="Straight Connector 11"/>
-          <p:cNvCxnSpPr/>
-          <p:nvPr/>
-        </p:nvCxnSpPr>
-        <p:spPr>
-          <a:xfrm>
-            <a:off x="5136030" y="1359430"/>
-            <a:ext cx="0" cy="1879913"/>
-          </a:xfrm>
-          <a:prstGeom prst="line">
-            <a:avLst/>
-          </a:prstGeom>
-          <a:ln w="28575">
-            <a:solidFill>
-              <a:schemeClr val="tx1">
-                <a:alpha val="60000"/>
-              </a:schemeClr>
-            </a:solidFill>
-          </a:ln>
-        </p:spPr>
-        <p:style>
-          <a:lnRef idx="1">
-            <a:schemeClr val="accent1"/>
-          </a:lnRef>
-          <a:fillRef idx="0">
-            <a:schemeClr val="accent1"/>
-          </a:fillRef>
-          <a:effectRef idx="0">
-            <a:schemeClr val="accent1"/>
-          </a:effectRef>
-          <a:fontRef idx="minor">
-            <a:schemeClr val="tx1"/>
-          </a:fontRef>
-        </p:style>
-      </p:cxnSp>
-      <p:sp>
-        <p:nvSpPr>
-          <p:cNvPr id="16" name="Rectangle 15"/>
-          <p:cNvSpPr/>
-          <p:nvPr/>
-        </p:nvSpPr>
-        <p:spPr>
-          <a:xfrm>
-            <a:off x="2555203" y="815059"/>
-            <a:ext cx="1834035" cy="848750"/>
-          </a:xfrm>
-          <a:prstGeom prst="rect">
-            <a:avLst/>
-          </a:prstGeom>
-          <a:solidFill>
-            <a:schemeClr val="bg1"/>
-          </a:solidFill>
-          <a:ln>
-            <a:solidFill>
-              <a:schemeClr val="tx1"/>
-            </a:solidFill>
-          </a:ln>
-        </p:spPr>
-        <p:style>
-          <a:lnRef idx="2">
-            <a:schemeClr val="accent1">
-              <a:shade val="50000"/>
-            </a:schemeClr>
-          </a:lnRef>
-          <a:fillRef idx="1">
-            <a:schemeClr val="accent1"/>
-          </a:fillRef>
-          <a:effectRef idx="0">
-            <a:schemeClr val="accent1"/>
-          </a:effectRef>
-          <a:fontRef idx="minor">
-            <a:schemeClr val="lt1"/>
-          </a:fontRef>
-        </p:style>
-        <p:txBody>
-          <a:bodyPr rtlCol="0" anchor="ctr"/>
-          <a:lstStyle/>
-          <a:p>
-            <a:pPr algn="ctr"/>
-            <a:r>
-              <a:rPr lang="en-US" b="1" smtClean="0">
-                <a:solidFill>
-                  <a:schemeClr val="tx1"/>
-                </a:solidFill>
-                <a:latin typeface="Segoe UI" panose="020B0502040204020203" pitchFamily="34" charset="0"/>
-                <a:cs typeface="Segoe UI" panose="020B0502040204020203" pitchFamily="34" charset="0"/>
-              </a:rPr>
-              <a:t>User</a:t>
-            </a:r>
-          </a:p>
-          <a:p>
-            <a:pPr algn="ctr"/>
-            <a:r>
-              <a:rPr lang="en-US" b="1" smtClean="0">
-                <a:solidFill>
-                  <a:schemeClr val="tx1"/>
-                </a:solidFill>
-                <a:latin typeface="Segoe UI" panose="020B0502040204020203" pitchFamily="34" charset="0"/>
-                <a:cs typeface="Segoe UI" panose="020B0502040204020203" pitchFamily="34" charset="0"/>
-              </a:rPr>
-              <a:t>Authentication</a:t>
-            </a:r>
-          </a:p>
-          <a:p>
-            <a:pPr algn="ctr"/>
-            <a:r>
-              <a:rPr lang="en-US" smtClean="0">
-                <a:solidFill>
-                  <a:schemeClr val="tx1"/>
-                </a:solidFill>
-                <a:latin typeface="Segoe UI" panose="020B0502040204020203" pitchFamily="34" charset="0"/>
-                <a:cs typeface="Segoe UI" panose="020B0502040204020203" pitchFamily="34" charset="0"/>
-              </a:rPr>
-              <a:t>Service</a:t>
-            </a:r>
-            <a:endParaRPr lang="en-US">
-              <a:solidFill>
-                <a:schemeClr val="tx1"/>
-              </a:solidFill>
-              <a:latin typeface="Segoe UI" panose="020B0502040204020203" pitchFamily="34" charset="0"/>
-              <a:cs typeface="Segoe UI" panose="020B0502040204020203" pitchFamily="34" charset="0"/>
-            </a:endParaRPr>
-          </a:p>
-        </p:txBody>
-      </p:sp>
-      <p:sp>
-        <p:nvSpPr>
-          <p:cNvPr id="22" name="Rectangle 21"/>
-          <p:cNvSpPr/>
-          <p:nvPr/>
-        </p:nvSpPr>
-        <p:spPr>
-          <a:xfrm>
-            <a:off x="5455765" y="4610943"/>
-            <a:ext cx="2115733" cy="684957"/>
-          </a:xfrm>
-          <a:prstGeom prst="rect">
-            <a:avLst/>
-          </a:prstGeom>
-          <a:noFill/>
-          <a:ln>
-            <a:solidFill>
-              <a:schemeClr val="tx1"/>
-            </a:solidFill>
-          </a:ln>
-        </p:spPr>
-        <p:style>
-          <a:lnRef idx="2">
-            <a:schemeClr val="accent1">
-              <a:shade val="50000"/>
-            </a:schemeClr>
-          </a:lnRef>
-          <a:fillRef idx="1">
-            <a:schemeClr val="accent1"/>
-          </a:fillRef>
-          <a:effectRef idx="0">
-            <a:schemeClr val="accent1"/>
-          </a:effectRef>
-          <a:fontRef idx="minor">
-            <a:schemeClr val="lt1"/>
-          </a:fontRef>
-        </p:style>
-        <p:txBody>
-          <a:bodyPr rtlCol="0" anchor="ctr"/>
-          <a:lstStyle/>
-          <a:p>
-            <a:pPr algn="ctr"/>
-            <a:r>
-              <a:rPr lang="en-US" b="1" smtClean="0">
-                <a:solidFill>
-                  <a:schemeClr val="tx1"/>
-                </a:solidFill>
-                <a:latin typeface="Segoe UI" panose="020B0502040204020203" pitchFamily="34" charset="0"/>
-                <a:cs typeface="Segoe UI" panose="020B0502040204020203" pitchFamily="34" charset="0"/>
-              </a:rPr>
-              <a:t>Blog</a:t>
-            </a:r>
-          </a:p>
-          <a:p>
-            <a:pPr algn="ctr"/>
-            <a:r>
-              <a:rPr lang="en-US" smtClean="0">
-                <a:solidFill>
-                  <a:schemeClr val="tx1"/>
-                </a:solidFill>
-                <a:latin typeface="Segoe UI" panose="020B0502040204020203" pitchFamily="34" charset="0"/>
-                <a:cs typeface="Segoe UI" panose="020B0502040204020203" pitchFamily="34" charset="0"/>
-              </a:rPr>
-              <a:t>component</a:t>
-            </a:r>
-            <a:endParaRPr lang="en-US">
-              <a:solidFill>
-                <a:schemeClr val="tx1"/>
-              </a:solidFill>
-              <a:latin typeface="Segoe UI" panose="020B0502040204020203" pitchFamily="34" charset="0"/>
-              <a:cs typeface="Segoe UI" panose="020B0502040204020203" pitchFamily="34" charset="0"/>
-            </a:endParaRPr>
-          </a:p>
-        </p:txBody>
-      </p:sp>
-      <p:cxnSp>
-        <p:nvCxnSpPr>
-          <p:cNvPr id="23" name="Straight Connector 22"/>
-          <p:cNvCxnSpPr/>
-          <p:nvPr/>
-        </p:nvCxnSpPr>
-        <p:spPr>
-          <a:xfrm>
-            <a:off x="6506161" y="1359430"/>
-            <a:ext cx="0" cy="3251513"/>
-          </a:xfrm>
-          <a:prstGeom prst="line">
-            <a:avLst/>
-          </a:prstGeom>
-          <a:ln w="28575">
-            <a:solidFill>
-              <a:schemeClr val="tx1">
-                <a:alpha val="60000"/>
-              </a:schemeClr>
-            </a:solidFill>
-          </a:ln>
-        </p:spPr>
-        <p:style>
-          <a:lnRef idx="1">
-            <a:schemeClr val="accent1"/>
-          </a:lnRef>
-          <a:fillRef idx="0">
-            <a:schemeClr val="accent1"/>
-          </a:fillRef>
-          <a:effectRef idx="0">
-            <a:schemeClr val="accent1"/>
-          </a:effectRef>
-          <a:fontRef idx="minor">
-            <a:schemeClr val="tx1"/>
-          </a:fontRef>
-        </p:style>
-      </p:cxnSp>
-      <p:sp>
-        <p:nvSpPr>
-          <p:cNvPr id="26" name="TextBox 25"/>
-          <p:cNvSpPr txBox="1"/>
-          <p:nvPr/>
-        </p:nvSpPr>
-        <p:spPr>
-          <a:xfrm rot="16200000">
-            <a:off x="6028813" y="3683129"/>
-            <a:ext cx="1322269" cy="400110"/>
-          </a:xfrm>
-          <a:prstGeom prst="rect">
-            <a:avLst/>
-          </a:prstGeom>
-          <a:noFill/>
-        </p:spPr>
-        <p:txBody>
-          <a:bodyPr wrap="square" rtlCol="0">
-            <a:spAutoFit/>
-          </a:bodyPr>
-          <a:lstStyle/>
-          <a:p>
-            <a:r>
-              <a:rPr lang="en-US" sz="2000" smtClean="0">
-                <a:latin typeface="Segoe UI" panose="020B0502040204020203" pitchFamily="34" charset="0"/>
-                <a:cs typeface="Segoe UI" panose="020B0502040204020203" pitchFamily="34" charset="0"/>
-              </a:rPr>
-              <a:t>member</a:t>
-            </a:r>
-          </a:p>
-        </p:txBody>
-      </p:sp>
-      <p:sp>
-        <p:nvSpPr>
-          <p:cNvPr id="17" name="TextBox 16"/>
-          <p:cNvSpPr txBox="1"/>
-          <p:nvPr/>
-        </p:nvSpPr>
-        <p:spPr>
-          <a:xfrm rot="16200000">
-            <a:off x="4249222" y="2295181"/>
-            <a:ext cx="1322269" cy="400110"/>
-          </a:xfrm>
-          <a:prstGeom prst="rect">
-            <a:avLst/>
-          </a:prstGeom>
-          <a:noFill/>
-        </p:spPr>
-        <p:txBody>
-          <a:bodyPr wrap="square" rtlCol="0">
-            <a:spAutoFit/>
-          </a:bodyPr>
-          <a:lstStyle/>
-          <a:p>
-            <a:r>
-              <a:rPr lang="en-US" sz="2000" smtClean="0">
-                <a:latin typeface="Segoe UI" panose="020B0502040204020203" pitchFamily="34" charset="0"/>
-                <a:cs typeface="Segoe UI" panose="020B0502040204020203" pitchFamily="34" charset="0"/>
-              </a:rPr>
-              <a:t>member</a:t>
-            </a:r>
-          </a:p>
-        </p:txBody>
-      </p:sp>
-      <p:sp>
-        <p:nvSpPr>
-          <p:cNvPr id="18" name="TextBox 17"/>
-          <p:cNvSpPr txBox="1"/>
-          <p:nvPr/>
-        </p:nvSpPr>
-        <p:spPr>
-          <a:xfrm rot="16200000">
-            <a:off x="947222" y="2360859"/>
-            <a:ext cx="1322269" cy="400110"/>
-          </a:xfrm>
-          <a:prstGeom prst="rect">
-            <a:avLst/>
-          </a:prstGeom>
-          <a:noFill/>
-        </p:spPr>
-        <p:txBody>
-          <a:bodyPr wrap="square" rtlCol="0">
-            <a:spAutoFit/>
-          </a:bodyPr>
-          <a:lstStyle/>
-          <a:p>
-            <a:r>
-              <a:rPr lang="en-US" sz="2000" smtClean="0">
-                <a:latin typeface="Segoe UI" panose="020B0502040204020203" pitchFamily="34" charset="0"/>
-                <a:cs typeface="Segoe UI" panose="020B0502040204020203" pitchFamily="34" charset="0"/>
-              </a:rPr>
-              <a:t>member</a:t>
-            </a:r>
-          </a:p>
-        </p:txBody>
-      </p:sp>
-    </p:spTree>
-    <p:extLst>
-      <p:ext uri="{BB962C8B-B14F-4D97-AF65-F5344CB8AC3E}">
-        <p14:creationId xmlns:p14="http://schemas.microsoft.com/office/powerpoint/2010/main" val="1077959041"/>
-      </p:ext>
-    </p:extLst>
-  </p:cSld>
-  <p:clrMapOvr>
-    <a:masterClrMapping/>
-  </p:clrMapOvr>
-  <p:timing>
-    <p:tnLst>
-      <p:par>
-        <p:cTn id="1" dur="indefinite" restart="never" nodeType="tmRoot"/>
-      </p:par>
-    </p:tnLst>
-  </p:timing>
-</p:sld>
-</file>
-
 <file path=ppt/theme/theme1.xml><?xml version="1.0" encoding="utf-8"?>
 <a:theme xmlns:a="http://schemas.openxmlformats.org/drawingml/2006/main" name="Slice">
   <a:themeElements>

</xml_diff>